<commit_message>
major update to crypto
</commit_message>
<xml_diff>
--- a/7.Adv_SSH/drawings/SSH-Extras.pptx
+++ b/7.Adv_SSH/drawings/SSH-Extras.pptx
@@ -6,6 +6,7 @@
   </p:sldMasterIdLst>
   <p:sldIdLst>
     <p:sldId id="256" r:id="rId2"/>
+    <p:sldId id="257" r:id="rId3"/>
   </p:sldIdLst>
   <p:sldSz cx="12192000" cy="6858000"/>
   <p:notesSz cx="6858000" cy="9144000"/>
@@ -259,7 +260,7 @@
           <a:p>
             <a:fld id="{63CEF342-2B8E-41AF-AE9F-D7677EDF6AFA}" type="datetimeFigureOut">
               <a:rPr lang="en-US" smtClean="0"/>
-              <a:t>1/25/2019</a:t>
+              <a:t>4/18/2023</a:t>
             </a:fld>
             <a:endParaRPr lang="en-US"/>
           </a:p>
@@ -457,7 +458,7 @@
           <a:p>
             <a:fld id="{63CEF342-2B8E-41AF-AE9F-D7677EDF6AFA}" type="datetimeFigureOut">
               <a:rPr lang="en-US" smtClean="0"/>
-              <a:t>1/25/2019</a:t>
+              <a:t>4/18/2023</a:t>
             </a:fld>
             <a:endParaRPr lang="en-US"/>
           </a:p>
@@ -665,7 +666,7 @@
           <a:p>
             <a:fld id="{63CEF342-2B8E-41AF-AE9F-D7677EDF6AFA}" type="datetimeFigureOut">
               <a:rPr lang="en-US" smtClean="0"/>
-              <a:t>1/25/2019</a:t>
+              <a:t>4/18/2023</a:t>
             </a:fld>
             <a:endParaRPr lang="en-US"/>
           </a:p>
@@ -863,7 +864,7 @@
           <a:p>
             <a:fld id="{63CEF342-2B8E-41AF-AE9F-D7677EDF6AFA}" type="datetimeFigureOut">
               <a:rPr lang="en-US" smtClean="0"/>
-              <a:t>1/25/2019</a:t>
+              <a:t>4/18/2023</a:t>
             </a:fld>
             <a:endParaRPr lang="en-US"/>
           </a:p>
@@ -1138,7 +1139,7 @@
           <a:p>
             <a:fld id="{63CEF342-2B8E-41AF-AE9F-D7677EDF6AFA}" type="datetimeFigureOut">
               <a:rPr lang="en-US" smtClean="0"/>
-              <a:t>1/25/2019</a:t>
+              <a:t>4/18/2023</a:t>
             </a:fld>
             <a:endParaRPr lang="en-US"/>
           </a:p>
@@ -1403,7 +1404,7 @@
           <a:p>
             <a:fld id="{63CEF342-2B8E-41AF-AE9F-D7677EDF6AFA}" type="datetimeFigureOut">
               <a:rPr lang="en-US" smtClean="0"/>
-              <a:t>1/25/2019</a:t>
+              <a:t>4/18/2023</a:t>
             </a:fld>
             <a:endParaRPr lang="en-US"/>
           </a:p>
@@ -1815,7 +1816,7 @@
           <a:p>
             <a:fld id="{63CEF342-2B8E-41AF-AE9F-D7677EDF6AFA}" type="datetimeFigureOut">
               <a:rPr lang="en-US" smtClean="0"/>
-              <a:t>1/25/2019</a:t>
+              <a:t>4/18/2023</a:t>
             </a:fld>
             <a:endParaRPr lang="en-US"/>
           </a:p>
@@ -1956,7 +1957,7 @@
           <a:p>
             <a:fld id="{63CEF342-2B8E-41AF-AE9F-D7677EDF6AFA}" type="datetimeFigureOut">
               <a:rPr lang="en-US" smtClean="0"/>
-              <a:t>1/25/2019</a:t>
+              <a:t>4/18/2023</a:t>
             </a:fld>
             <a:endParaRPr lang="en-US"/>
           </a:p>
@@ -2069,7 +2070,7 @@
           <a:p>
             <a:fld id="{63CEF342-2B8E-41AF-AE9F-D7677EDF6AFA}" type="datetimeFigureOut">
               <a:rPr lang="en-US" smtClean="0"/>
-              <a:t>1/25/2019</a:t>
+              <a:t>4/18/2023</a:t>
             </a:fld>
             <a:endParaRPr lang="en-US"/>
           </a:p>
@@ -2380,7 +2381,7 @@
           <a:p>
             <a:fld id="{63CEF342-2B8E-41AF-AE9F-D7677EDF6AFA}" type="datetimeFigureOut">
               <a:rPr lang="en-US" smtClean="0"/>
-              <a:t>1/25/2019</a:t>
+              <a:t>4/18/2023</a:t>
             </a:fld>
             <a:endParaRPr lang="en-US"/>
           </a:p>
@@ -2668,7 +2669,7 @@
           <a:p>
             <a:fld id="{63CEF342-2B8E-41AF-AE9F-D7677EDF6AFA}" type="datetimeFigureOut">
               <a:rPr lang="en-US" smtClean="0"/>
-              <a:t>1/25/2019</a:t>
+              <a:t>4/18/2023</a:t>
             </a:fld>
             <a:endParaRPr lang="en-US"/>
           </a:p>
@@ -2909,7 +2910,7 @@
           <a:p>
             <a:fld id="{63CEF342-2B8E-41AF-AE9F-D7677EDF6AFA}" type="datetimeFigureOut">
               <a:rPr lang="en-US" smtClean="0"/>
-              <a:t>1/25/2019</a:t>
+              <a:t>4/18/2023</a:t>
             </a:fld>
             <a:endParaRPr lang="en-US"/>
           </a:p>
@@ -4104,6 +4105,334 @@
 </p:sld>
 </file>
 
+<file path=ppt/slides/slide2.xml><?xml version="1.0" encoding="utf-8"?>
+<p:sld xmlns:a="http://schemas.openxmlformats.org/drawingml/2006/main" xmlns:r="http://schemas.openxmlformats.org/officeDocument/2006/relationships" xmlns:p="http://schemas.openxmlformats.org/presentationml/2006/main">
+  <p:cSld>
+    <p:spTree>
+      <p:nvGrpSpPr>
+        <p:cNvPr id="1" name=""/>
+        <p:cNvGrpSpPr/>
+        <p:nvPr/>
+      </p:nvGrpSpPr>
+      <p:grpSpPr>
+        <a:xfrm>
+          <a:off x="0" y="0"/>
+          <a:ext cx="0" cy="0"/>
+          <a:chOff x="0" y="0"/>
+          <a:chExt cx="0" cy="0"/>
+        </a:xfrm>
+      </p:grpSpPr>
+      <p:sp>
+        <p:nvSpPr>
+          <p:cNvPr id="4" name="Rectangle 3">
+            <a:extLst>
+              <a:ext uri="{FF2B5EF4-FFF2-40B4-BE49-F238E27FC236}">
+                <a16:creationId xmlns:a16="http://schemas.microsoft.com/office/drawing/2014/main" id="{61DA3AD5-C83A-A224-5371-DC24794E301A}"/>
+              </a:ext>
+            </a:extLst>
+          </p:cNvPr>
+          <p:cNvSpPr/>
+          <p:nvPr/>
+        </p:nvSpPr>
+        <p:spPr>
+          <a:xfrm>
+            <a:off x="3598877" y="4819895"/>
+            <a:ext cx="1275127" cy="604007"/>
+          </a:xfrm>
+          <a:prstGeom prst="rect">
+            <a:avLst/>
+          </a:prstGeom>
+        </p:spPr>
+        <p:style>
+          <a:lnRef idx="2">
+            <a:schemeClr val="accent1">
+              <a:shade val="50000"/>
+            </a:schemeClr>
+          </a:lnRef>
+          <a:fillRef idx="1">
+            <a:schemeClr val="accent1"/>
+          </a:fillRef>
+          <a:effectRef idx="0">
+            <a:schemeClr val="accent1"/>
+          </a:effectRef>
+          <a:fontRef idx="minor">
+            <a:schemeClr val="lt1"/>
+          </a:fontRef>
+        </p:style>
+        <p:txBody>
+          <a:bodyPr rtlCol="0" anchor="ctr"/>
+          <a:lstStyle/>
+          <a:p>
+            <a:pPr algn="ctr"/>
+            <a:r>
+              <a:rPr lang="en-US" dirty="0"/>
+              <a:t>SSH Server</a:t>
+            </a:r>
+          </a:p>
+        </p:txBody>
+      </p:sp>
+      <p:sp>
+        <p:nvSpPr>
+          <p:cNvPr id="5" name="Rectangle 4">
+            <a:extLst>
+              <a:ext uri="{FF2B5EF4-FFF2-40B4-BE49-F238E27FC236}">
+                <a16:creationId xmlns:a16="http://schemas.microsoft.com/office/drawing/2014/main" id="{DAB871B5-F9EF-7B2B-86E7-EA1B11536298}"/>
+              </a:ext>
+            </a:extLst>
+          </p:cNvPr>
+          <p:cNvSpPr/>
+          <p:nvPr/>
+        </p:nvSpPr>
+        <p:spPr>
+          <a:xfrm>
+            <a:off x="6042868" y="4819893"/>
+            <a:ext cx="1275127" cy="604007"/>
+          </a:xfrm>
+          <a:prstGeom prst="rect">
+            <a:avLst/>
+          </a:prstGeom>
+        </p:spPr>
+        <p:style>
+          <a:lnRef idx="2">
+            <a:schemeClr val="accent1">
+              <a:shade val="50000"/>
+            </a:schemeClr>
+          </a:lnRef>
+          <a:fillRef idx="1">
+            <a:schemeClr val="accent1"/>
+          </a:fillRef>
+          <a:effectRef idx="0">
+            <a:schemeClr val="accent1"/>
+          </a:effectRef>
+          <a:fontRef idx="minor">
+            <a:schemeClr val="lt1"/>
+          </a:fontRef>
+        </p:style>
+        <p:txBody>
+          <a:bodyPr rtlCol="0" anchor="ctr"/>
+          <a:lstStyle/>
+          <a:p>
+            <a:pPr algn="ctr"/>
+            <a:r>
+              <a:rPr lang="en-US" dirty="0"/>
+              <a:t>Host Machine</a:t>
+            </a:r>
+          </a:p>
+        </p:txBody>
+      </p:sp>
+      <p:sp>
+        <p:nvSpPr>
+          <p:cNvPr id="6" name="Cloud 5">
+            <a:extLst>
+              <a:ext uri="{FF2B5EF4-FFF2-40B4-BE49-F238E27FC236}">
+                <a16:creationId xmlns:a16="http://schemas.microsoft.com/office/drawing/2014/main" id="{62897398-7D46-80FA-AFED-47A462D2E9CB}"/>
+              </a:ext>
+            </a:extLst>
+          </p:cNvPr>
+          <p:cNvSpPr/>
+          <p:nvPr/>
+        </p:nvSpPr>
+        <p:spPr>
+          <a:xfrm>
+            <a:off x="3422469" y="3429000"/>
+            <a:ext cx="1682231" cy="635885"/>
+          </a:xfrm>
+          <a:prstGeom prst="cloud">
+            <a:avLst/>
+          </a:prstGeom>
+        </p:spPr>
+        <p:style>
+          <a:lnRef idx="2">
+            <a:schemeClr val="accent1">
+              <a:shade val="50000"/>
+            </a:schemeClr>
+          </a:lnRef>
+          <a:fillRef idx="1">
+            <a:schemeClr val="accent1"/>
+          </a:fillRef>
+          <a:effectRef idx="0">
+            <a:schemeClr val="accent1"/>
+          </a:effectRef>
+          <a:fontRef idx="minor">
+            <a:schemeClr val="lt1"/>
+          </a:fontRef>
+        </p:style>
+        <p:txBody>
+          <a:bodyPr rtlCol="0" anchor="ctr"/>
+          <a:lstStyle/>
+          <a:p>
+            <a:pPr algn="ctr"/>
+            <a:r>
+              <a:rPr lang="en-US" dirty="0"/>
+              <a:t>Internet</a:t>
+            </a:r>
+          </a:p>
+        </p:txBody>
+      </p:sp>
+      <p:cxnSp>
+        <p:nvCxnSpPr>
+          <p:cNvPr id="7" name="Straight Connector 6">
+            <a:extLst>
+              <a:ext uri="{FF2B5EF4-FFF2-40B4-BE49-F238E27FC236}">
+                <a16:creationId xmlns:a16="http://schemas.microsoft.com/office/drawing/2014/main" id="{C5F26B28-147B-D18C-D1B1-281F24AA8564}"/>
+              </a:ext>
+            </a:extLst>
+          </p:cNvPr>
+          <p:cNvCxnSpPr>
+            <a:stCxn id="4" idx="3"/>
+            <a:endCxn id="5" idx="1"/>
+          </p:cNvCxnSpPr>
+          <p:nvPr/>
+        </p:nvCxnSpPr>
+        <p:spPr>
+          <a:xfrm flipV="1">
+            <a:off x="4874004" y="5121897"/>
+            <a:ext cx="1168864" cy="2"/>
+          </a:xfrm>
+          <a:prstGeom prst="line">
+            <a:avLst/>
+          </a:prstGeom>
+          <a:ln w="28575"/>
+        </p:spPr>
+        <p:style>
+          <a:lnRef idx="1">
+            <a:schemeClr val="accent1"/>
+          </a:lnRef>
+          <a:fillRef idx="0">
+            <a:schemeClr val="accent1"/>
+          </a:fillRef>
+          <a:effectRef idx="0">
+            <a:schemeClr val="accent1"/>
+          </a:effectRef>
+          <a:fontRef idx="minor">
+            <a:schemeClr val="tx1"/>
+          </a:fontRef>
+        </p:style>
+      </p:cxnSp>
+      <p:cxnSp>
+        <p:nvCxnSpPr>
+          <p:cNvPr id="8" name="Straight Connector 7">
+            <a:extLst>
+              <a:ext uri="{FF2B5EF4-FFF2-40B4-BE49-F238E27FC236}">
+                <a16:creationId xmlns:a16="http://schemas.microsoft.com/office/drawing/2014/main" id="{E925E450-3304-BC61-4B36-389A88FD4597}"/>
+              </a:ext>
+            </a:extLst>
+          </p:cNvPr>
+          <p:cNvCxnSpPr>
+            <a:cxnSpLocks/>
+            <a:stCxn id="4" idx="0"/>
+            <a:endCxn id="6" idx="1"/>
+          </p:cNvCxnSpPr>
+          <p:nvPr/>
+        </p:nvCxnSpPr>
+        <p:spPr>
+          <a:xfrm flipV="1">
+            <a:off x="4236441" y="4064208"/>
+            <a:ext cx="27144" cy="755687"/>
+          </a:xfrm>
+          <a:prstGeom prst="line">
+            <a:avLst/>
+          </a:prstGeom>
+          <a:ln w="28575"/>
+        </p:spPr>
+        <p:style>
+          <a:lnRef idx="1">
+            <a:schemeClr val="accent1"/>
+          </a:lnRef>
+          <a:fillRef idx="0">
+            <a:schemeClr val="accent1"/>
+          </a:fillRef>
+          <a:effectRef idx="0">
+            <a:schemeClr val="accent1"/>
+          </a:effectRef>
+          <a:fontRef idx="minor">
+            <a:schemeClr val="tx1"/>
+          </a:fontRef>
+        </p:style>
+      </p:cxnSp>
+      <p:sp>
+        <p:nvSpPr>
+          <p:cNvPr id="11" name="TextBox 10">
+            <a:extLst>
+              <a:ext uri="{FF2B5EF4-FFF2-40B4-BE49-F238E27FC236}">
+                <a16:creationId xmlns:a16="http://schemas.microsoft.com/office/drawing/2014/main" id="{1D4DE31F-678A-A15A-4785-8C1BB68810AD}"/>
+              </a:ext>
+            </a:extLst>
+          </p:cNvPr>
+          <p:cNvSpPr txBox="1"/>
+          <p:nvPr/>
+        </p:nvSpPr>
+        <p:spPr>
+          <a:xfrm>
+            <a:off x="4980263" y="4819547"/>
+            <a:ext cx="956345" cy="276999"/>
+          </a:xfrm>
+          <a:prstGeom prst="rect">
+            <a:avLst/>
+          </a:prstGeom>
+          <a:noFill/>
+        </p:spPr>
+        <p:txBody>
+          <a:bodyPr wrap="square" rtlCol="0">
+            <a:spAutoFit/>
+          </a:bodyPr>
+          <a:lstStyle/>
+          <a:p>
+            <a:r>
+              <a:rPr lang="en-US" sz="1200" dirty="0"/>
+              <a:t>SSH tunnel</a:t>
+            </a:r>
+          </a:p>
+        </p:txBody>
+      </p:sp>
+      <p:sp>
+        <p:nvSpPr>
+          <p:cNvPr id="15" name="TextBox 14">
+            <a:extLst>
+              <a:ext uri="{FF2B5EF4-FFF2-40B4-BE49-F238E27FC236}">
+                <a16:creationId xmlns:a16="http://schemas.microsoft.com/office/drawing/2014/main" id="{7E30F77E-7CA9-8847-A326-339AAFC56023}"/>
+              </a:ext>
+            </a:extLst>
+          </p:cNvPr>
+          <p:cNvSpPr txBox="1"/>
+          <p:nvPr/>
+        </p:nvSpPr>
+        <p:spPr>
+          <a:xfrm>
+            <a:off x="3293668" y="4357882"/>
+            <a:ext cx="956345" cy="461665"/>
+          </a:xfrm>
+          <a:prstGeom prst="rect">
+            <a:avLst/>
+          </a:prstGeom>
+          <a:noFill/>
+        </p:spPr>
+        <p:txBody>
+          <a:bodyPr wrap="square" rtlCol="0">
+            <a:spAutoFit/>
+          </a:bodyPr>
+          <a:lstStyle/>
+          <a:p>
+            <a:r>
+              <a:rPr lang="en-US" sz="1200" dirty="0"/>
+              <a:t>SSH Server’s IP address</a:t>
+            </a:r>
+          </a:p>
+        </p:txBody>
+      </p:sp>
+    </p:spTree>
+    <p:extLst>
+      <p:ext uri="{BB962C8B-B14F-4D97-AF65-F5344CB8AC3E}">
+        <p14:creationId xmlns:p14="http://schemas.microsoft.com/office/powerpoint/2010/main" val="635368696"/>
+      </p:ext>
+    </p:extLst>
+  </p:cSld>
+  <p:clrMapOvr>
+    <a:masterClrMapping/>
+  </p:clrMapOvr>
+</p:sld>
+</file>
+
 <file path=ppt/theme/theme1.xml><?xml version="1.0" encoding="utf-8"?>
 <a:theme xmlns:a="http://schemas.openxmlformats.org/drawingml/2006/main" name="Office Theme">
   <a:themeElements>

</xml_diff>